<commit_message>
changing strain names for plotting and generating figures for paper again
</commit_message>
<xml_diff>
--- a/plots/CPS_fitness/figure_4_final.pptx
+++ b/plots/CPS_fitness/figure_4_final.pptx
@@ -115,8 +115,7 @@
 <file path=ppt/revisionInfo.xml><?xml version="1.0" encoding="utf-8"?>
 <p1510:revInfo xmlns:a="http://schemas.openxmlformats.org/drawingml/2006/main" xmlns:r="http://schemas.openxmlformats.org/officeDocument/2006/relationships" xmlns:p1510="http://schemas.microsoft.com/office/powerpoint/2015/10/main">
   <p1510:revLst>
-    <p1510:client id="{7E301796-C042-A649-8515-9A181D387D07}" v="1" dt="2023-08-15T13:26:09.830"/>
-    <p1510:client id="{D0973372-19C4-F949-9CCC-20875613BD86}" v="1" dt="2023-08-15T13:30:27.020"/>
+    <p1510:client id="{D0973372-19C4-F949-9CCC-20875613BD86}" v="4" dt="2023-08-24T17:29:03"/>
   </p1510:revLst>
 </p1510:revInfo>
 </file>
@@ -173,27 +172,43 @@
   </pc:docChgLst>
   <pc:docChgLst>
     <pc:chgData name="Cecilia Trivellin" userId="77962b75-de7c-4c40-bb6b-4b915835e2f5" providerId="ADAL" clId="{D0973372-19C4-F949-9CCC-20875613BD86}"/>
-    <pc:docChg chg="modSld">
-      <pc:chgData name="Cecilia Trivellin" userId="77962b75-de7c-4c40-bb6b-4b915835e2f5" providerId="ADAL" clId="{D0973372-19C4-F949-9CCC-20875613BD86}" dt="2023-08-15T13:32:53.389" v="137" actId="20577"/>
+    <pc:docChg chg="custSel modSld">
+      <pc:chgData name="Cecilia Trivellin" userId="77962b75-de7c-4c40-bb6b-4b915835e2f5" providerId="ADAL" clId="{D0973372-19C4-F949-9CCC-20875613BD86}" dt="2023-08-24T17:29:28.302" v="153" actId="20577"/>
       <pc:docMkLst>
         <pc:docMk/>
       </pc:docMkLst>
-      <pc:sldChg chg="modSp mod">
-        <pc:chgData name="Cecilia Trivellin" userId="77962b75-de7c-4c40-bb6b-4b915835e2f5" providerId="ADAL" clId="{D0973372-19C4-F949-9CCC-20875613BD86}" dt="2023-08-15T13:32:53.389" v="137" actId="20577"/>
+      <pc:sldChg chg="addSp delSp modSp mod">
+        <pc:chgData name="Cecilia Trivellin" userId="77962b75-de7c-4c40-bb6b-4b915835e2f5" providerId="ADAL" clId="{D0973372-19C4-F949-9CCC-20875613BD86}" dt="2023-08-24T17:29:28.302" v="153" actId="20577"/>
         <pc:sldMkLst>
           <pc:docMk/>
           <pc:sldMk cId="1624886000" sldId="256"/>
         </pc:sldMkLst>
         <pc:spChg chg="mod">
-          <ac:chgData name="Cecilia Trivellin" userId="77962b75-de7c-4c40-bb6b-4b915835e2f5" providerId="ADAL" clId="{D0973372-19C4-F949-9CCC-20875613BD86}" dt="2023-08-15T13:32:53.389" v="137" actId="20577"/>
+          <ac:chgData name="Cecilia Trivellin" userId="77962b75-de7c-4c40-bb6b-4b915835e2f5" providerId="ADAL" clId="{D0973372-19C4-F949-9CCC-20875613BD86}" dt="2023-08-24T17:29:28.302" v="153" actId="20577"/>
           <ac:spMkLst>
             <pc:docMk/>
             <pc:sldMk cId="1624886000" sldId="256"/>
             <ac:spMk id="23" creationId="{55C96A3D-FBC5-F10B-3AA7-4D5A897E4A32}"/>
           </ac:spMkLst>
         </pc:spChg>
-        <pc:picChg chg="mod">
-          <ac:chgData name="Cecilia Trivellin" userId="77962b75-de7c-4c40-bb6b-4b915835e2f5" providerId="ADAL" clId="{D0973372-19C4-F949-9CCC-20875613BD86}" dt="2023-08-15T13:30:27.019" v="0" actId="14826"/>
+        <pc:picChg chg="add del mod">
+          <ac:chgData name="Cecilia Trivellin" userId="77962b75-de7c-4c40-bb6b-4b915835e2f5" providerId="ADAL" clId="{D0973372-19C4-F949-9CCC-20875613BD86}" dt="2023-08-24T17:28:17.283" v="140" actId="478"/>
+          <ac:picMkLst>
+            <pc:docMk/>
+            <pc:sldMk cId="1624886000" sldId="256"/>
+            <ac:picMk id="3" creationId="{4DD041ED-1856-6507-1750-9F879B75A67D}"/>
+          </ac:picMkLst>
+        </pc:picChg>
+        <pc:picChg chg="add mod">
+          <ac:chgData name="Cecilia Trivellin" userId="77962b75-de7c-4c40-bb6b-4b915835e2f5" providerId="ADAL" clId="{D0973372-19C4-F949-9CCC-20875613BD86}" dt="2023-08-24T17:29:14.723" v="147" actId="14100"/>
+          <ac:picMkLst>
+            <pc:docMk/>
+            <pc:sldMk cId="1624886000" sldId="256"/>
+            <ac:picMk id="5" creationId="{E890B438-AAE1-F262-B05E-751A8382F1AA}"/>
+          </ac:picMkLst>
+        </pc:picChg>
+        <pc:picChg chg="del mod">
+          <ac:chgData name="Cecilia Trivellin" userId="77962b75-de7c-4c40-bb6b-4b915835e2f5" providerId="ADAL" clId="{D0973372-19C4-F949-9CCC-20875613BD86}" dt="2023-08-24T17:28:47.054" v="143" actId="478"/>
           <ac:picMkLst>
             <pc:docMk/>
             <pc:sldMk cId="1624886000" sldId="256"/>
@@ -337,7 +352,7 @@
           <a:p>
             <a:fld id="{BB4388B5-74DE-BA45-9FD7-F6D5BDF0B5A1}" type="datetimeFigureOut">
               <a:rPr lang="en-US" smtClean="0"/>
-              <a:t>8/15/23</a:t>
+              <a:t>8/24/23</a:t>
             </a:fld>
             <a:endParaRPr lang="en-US"/>
           </a:p>
@@ -507,7 +522,7 @@
           <a:p>
             <a:fld id="{BB4388B5-74DE-BA45-9FD7-F6D5BDF0B5A1}" type="datetimeFigureOut">
               <a:rPr lang="en-US" smtClean="0"/>
-              <a:t>8/15/23</a:t>
+              <a:t>8/24/23</a:t>
             </a:fld>
             <a:endParaRPr lang="en-US"/>
           </a:p>
@@ -687,7 +702,7 @@
           <a:p>
             <a:fld id="{BB4388B5-74DE-BA45-9FD7-F6D5BDF0B5A1}" type="datetimeFigureOut">
               <a:rPr lang="en-US" smtClean="0"/>
-              <a:t>8/15/23</a:t>
+              <a:t>8/24/23</a:t>
             </a:fld>
             <a:endParaRPr lang="en-US"/>
           </a:p>
@@ -857,7 +872,7 @@
           <a:p>
             <a:fld id="{BB4388B5-74DE-BA45-9FD7-F6D5BDF0B5A1}" type="datetimeFigureOut">
               <a:rPr lang="en-US" smtClean="0"/>
-              <a:t>8/15/23</a:t>
+              <a:t>8/24/23</a:t>
             </a:fld>
             <a:endParaRPr lang="en-US"/>
           </a:p>
@@ -1101,7 +1116,7 @@
           <a:p>
             <a:fld id="{BB4388B5-74DE-BA45-9FD7-F6D5BDF0B5A1}" type="datetimeFigureOut">
               <a:rPr lang="en-US" smtClean="0"/>
-              <a:t>8/15/23</a:t>
+              <a:t>8/24/23</a:t>
             </a:fld>
             <a:endParaRPr lang="en-US"/>
           </a:p>
@@ -1333,7 +1348,7 @@
           <a:p>
             <a:fld id="{BB4388B5-74DE-BA45-9FD7-F6D5BDF0B5A1}" type="datetimeFigureOut">
               <a:rPr lang="en-US" smtClean="0"/>
-              <a:t>8/15/23</a:t>
+              <a:t>8/24/23</a:t>
             </a:fld>
             <a:endParaRPr lang="en-US"/>
           </a:p>
@@ -1700,7 +1715,7 @@
           <a:p>
             <a:fld id="{BB4388B5-74DE-BA45-9FD7-F6D5BDF0B5A1}" type="datetimeFigureOut">
               <a:rPr lang="en-US" smtClean="0"/>
-              <a:t>8/15/23</a:t>
+              <a:t>8/24/23</a:t>
             </a:fld>
             <a:endParaRPr lang="en-US"/>
           </a:p>
@@ -1818,7 +1833,7 @@
           <a:p>
             <a:fld id="{BB4388B5-74DE-BA45-9FD7-F6D5BDF0B5A1}" type="datetimeFigureOut">
               <a:rPr lang="en-US" smtClean="0"/>
-              <a:t>8/15/23</a:t>
+              <a:t>8/24/23</a:t>
             </a:fld>
             <a:endParaRPr lang="en-US"/>
           </a:p>
@@ -1913,7 +1928,7 @@
           <a:p>
             <a:fld id="{BB4388B5-74DE-BA45-9FD7-F6D5BDF0B5A1}" type="datetimeFigureOut">
               <a:rPr lang="en-US" smtClean="0"/>
-              <a:t>8/15/23</a:t>
+              <a:t>8/24/23</a:t>
             </a:fld>
             <a:endParaRPr lang="en-US"/>
           </a:p>
@@ -2190,7 +2205,7 @@
           <a:p>
             <a:fld id="{BB4388B5-74DE-BA45-9FD7-F6D5BDF0B5A1}" type="datetimeFigureOut">
               <a:rPr lang="en-US" smtClean="0"/>
-              <a:t>8/15/23</a:t>
+              <a:t>8/24/23</a:t>
             </a:fld>
             <a:endParaRPr lang="en-US"/>
           </a:p>
@@ -2447,7 +2462,7 @@
           <a:p>
             <a:fld id="{BB4388B5-74DE-BA45-9FD7-F6D5BDF0B5A1}" type="datetimeFigureOut">
               <a:rPr lang="en-US" smtClean="0"/>
-              <a:t>8/15/23</a:t>
+              <a:t>8/24/23</a:t>
             </a:fld>
             <a:endParaRPr lang="en-US"/>
           </a:p>
@@ -2660,7 +2675,7 @@
           <a:p>
             <a:fld id="{BB4388B5-74DE-BA45-9FD7-F6D5BDF0B5A1}" type="datetimeFigureOut">
               <a:rPr lang="en-US" smtClean="0"/>
-              <a:t>8/15/23</a:t>
+              <a:t>8/24/23</a:t>
             </a:fld>
             <a:endParaRPr lang="en-US"/>
           </a:p>
@@ -3067,10 +3082,10 @@
       </p:grpSpPr>
       <p:pic>
         <p:nvPicPr>
-          <p:cNvPr id="9" name="Picture 8">
+          <p:cNvPr id="5" name="Picture 4">
             <a:extLst>
               <a:ext uri="{FF2B5EF4-FFF2-40B4-BE49-F238E27FC236}">
-                <a16:creationId xmlns:a16="http://schemas.microsoft.com/office/drawing/2014/main" id="{68954042-0BD1-1A76-53ED-46D24327A855}"/>
+                <a16:creationId xmlns:a16="http://schemas.microsoft.com/office/drawing/2014/main" id="{E890B438-AAE1-F262-B05E-751A8382F1AA}"/>
               </a:ext>
             </a:extLst>
           </p:cNvPr>
@@ -3081,13 +3096,14 @@
         </p:nvPicPr>
         <p:blipFill>
           <a:blip r:embed="rId2"/>
-          <a:srcRect/>
-          <a:stretch/>
+          <a:stretch>
+            <a:fillRect/>
+          </a:stretch>
         </p:blipFill>
         <p:spPr>
           <a:xfrm>
-            <a:off x="618350" y="331740"/>
-            <a:ext cx="8525650" cy="5683766"/>
+            <a:off x="758278" y="391233"/>
+            <a:ext cx="8385722" cy="5590481"/>
           </a:xfrm>
           <a:prstGeom prst="rect">
             <a:avLst/>
@@ -3630,28 +3646,7 @@
                 <a:latin typeface="Arial" panose="020B0604020202020204" pitchFamily="34" charset="0"/>
                 <a:cs typeface="Arial" panose="020B0604020202020204" pitchFamily="34" charset="0"/>
               </a:rPr>
-              <a:t>PERTUBATION SPACE: Set of sugars and antifungal agents (~ Costanzo </a:t>
-            </a:r>
-            <a:r>
-              <a:rPr lang="en-US" sz="1400" b="1" i="1" dirty="0" err="1">
-                <a:latin typeface="Arial" panose="020B0604020202020204" pitchFamily="34" charset="0"/>
-                <a:cs typeface="Arial" panose="020B0604020202020204" pitchFamily="34" charset="0"/>
-              </a:rPr>
-              <a:t>et.al</a:t>
-            </a:r>
-            <a:r>
-              <a:rPr lang="en-US" sz="1400" b="1" i="1" dirty="0">
-                <a:latin typeface="Arial" panose="020B0604020202020204" pitchFamily="34" charset="0"/>
-                <a:cs typeface="Arial" panose="020B0604020202020204" pitchFamily="34" charset="0"/>
-              </a:rPr>
-              <a:t>.,</a:t>
-            </a:r>
-            <a:r>
-              <a:rPr lang="en-US" sz="1400" b="1" dirty="0">
-                <a:latin typeface="Arial" panose="020B0604020202020204" pitchFamily="34" charset="0"/>
-                <a:cs typeface="Arial" panose="020B0604020202020204" pitchFamily="34" charset="0"/>
-              </a:rPr>
-              <a:t> perturbation set)</a:t>
+              <a:t>PERTUBATION SPACE: Set of sugars and antifungal agents (CPS)</a:t>
             </a:r>
           </a:p>
         </p:txBody>

</xml_diff>